<commit_message>
final version (without comments) pt 2
</commit_message>
<xml_diff>
--- a/Сборщик товаров.pptx
+++ b/Сборщик товаров.pptx
@@ -5,18 +5,21 @@
     <p:sldMasterId id="2147483672" r:id="rId1"/>
   </p:sldMasterIdLst>
   <p:notesMasterIdLst>
-    <p:notesMasterId r:id="rId8"/>
+    <p:notesMasterId r:id="rId11"/>
   </p:notesMasterIdLst>
   <p:handoutMasterIdLst>
-    <p:handoutMasterId r:id="rId9"/>
+    <p:handoutMasterId r:id="rId12"/>
   </p:handoutMasterIdLst>
   <p:sldIdLst>
     <p:sldId id="256" r:id="rId2"/>
-    <p:sldId id="261" r:id="rId3"/>
-    <p:sldId id="259" r:id="rId4"/>
-    <p:sldId id="258" r:id="rId5"/>
-    <p:sldId id="262" r:id="rId6"/>
-    <p:sldId id="260" r:id="rId7"/>
+    <p:sldId id="263" r:id="rId3"/>
+    <p:sldId id="261" r:id="rId4"/>
+    <p:sldId id="259" r:id="rId5"/>
+    <p:sldId id="258" r:id="rId6"/>
+    <p:sldId id="265" r:id="rId7"/>
+    <p:sldId id="264" r:id="rId8"/>
+    <p:sldId id="262" r:id="rId9"/>
+    <p:sldId id="260" r:id="rId10"/>
   </p:sldIdLst>
   <p:sldSz cx="12192000" cy="6858000"/>
   <p:notesSz cx="6858000" cy="9144000"/>
@@ -6586,7 +6589,7 @@
             <a:pPr rtl="0"/>
             <a:fld id="{AD9C4667-D0EB-4182-A979-F1BD41F3D31E}" type="datetime1">
               <a:rPr lang="ru-RU" smtClean="0"/>
-              <a:t>25.04.2023</a:t>
+              <a:t>01.05.23</a:t>
             </a:fld>
             <a:endParaRPr lang="ru-RU"/>
           </a:p>
@@ -6768,7 +6771,7 @@
             <a:pPr rtl="0"/>
             <a:fld id="{052E72FE-6225-48DC-96F7-A6D4A27B79B8}" type="datetime1">
               <a:rPr lang="ru-RU" noProof="0" smtClean="0"/>
-              <a:t>25.04.2023</a:t>
+              <a:t>01.05.23</a:t>
             </a:fld>
             <a:endParaRPr lang="ru-RU" noProof="0"/>
           </a:p>
@@ -7192,7 +7195,7 @@
             <a:pPr rtl="0"/>
             <a:fld id="{C6B3AB32-59DF-41F1-9618-EDFBF5049629}" type="slidenum">
               <a:rPr lang="ru-RU" smtClean="0"/>
-              <a:t>2</a:t>
+              <a:t>3</a:t>
             </a:fld>
             <a:endParaRPr lang="ru-RU"/>
           </a:p>
@@ -7278,7 +7281,7 @@
             <a:pPr rtl="0"/>
             <a:fld id="{C6B3AB32-59DF-41F1-9618-EDFBF5049629}" type="slidenum">
               <a:rPr lang="ru-RU" smtClean="0"/>
-              <a:t>3</a:t>
+              <a:t>4</a:t>
             </a:fld>
             <a:endParaRPr lang="ru-RU"/>
           </a:p>
@@ -7363,7 +7366,7 @@
             <a:pPr rtl="0"/>
             <a:fld id="{C6B3AB32-59DF-41F1-9618-EDFBF5049629}" type="slidenum">
               <a:rPr lang="ru-RU" smtClean="0"/>
-              <a:t>4</a:t>
+              <a:t>5</a:t>
             </a:fld>
             <a:endParaRPr lang="ru-RU"/>
           </a:p>
@@ -7449,7 +7452,7 @@
             <a:pPr rtl="0"/>
             <a:fld id="{C6B3AB32-59DF-41F1-9618-EDFBF5049629}" type="slidenum">
               <a:rPr lang="ru-RU" smtClean="0"/>
-              <a:t>6</a:t>
+              <a:t>9</a:t>
             </a:fld>
             <a:endParaRPr lang="ru-RU"/>
           </a:p>
@@ -7714,7 +7717,7 @@
             <a:pPr rtl="0"/>
             <a:fld id="{8A5E3DB2-6224-4F87-96B2-901B51FC324F}" type="datetime1">
               <a:rPr lang="ru-RU" noProof="0" smtClean="0"/>
-              <a:t>25.04.2023</a:t>
+              <a:t>01.05.23</a:t>
             </a:fld>
             <a:endParaRPr lang="ru-RU" noProof="0"/>
           </a:p>
@@ -7979,7 +7982,7 @@
             <a:pPr rtl="0"/>
             <a:fld id="{E0724630-BB87-4AF9-A3EB-1FC0B7D5A0A2}" type="datetime1">
               <a:rPr lang="ru-RU" noProof="0" smtClean="0"/>
-              <a:t>25.04.2023</a:t>
+              <a:t>01.05.23</a:t>
             </a:fld>
             <a:endParaRPr lang="ru-RU" noProof="0"/>
           </a:p>
@@ -8217,7 +8220,7 @@
             <a:pPr rtl="0"/>
             <a:fld id="{3ED2A334-CAC3-41D9-9F20-8680444032ED}" type="datetime1">
               <a:rPr lang="ru-RU" noProof="0" smtClean="0"/>
-              <a:t>25.04.2023</a:t>
+              <a:t>01.05.23</a:t>
             </a:fld>
             <a:endParaRPr lang="ru-RU" noProof="0"/>
           </a:p>
@@ -8460,7 +8463,7 @@
             <a:pPr rtl="0"/>
             <a:fld id="{2941335E-9FC5-4332-89A1-F61C26AF68B8}" type="datetime1">
               <a:rPr lang="ru-RU" noProof="0" smtClean="0"/>
-              <a:t>25.04.2023</a:t>
+              <a:t>01.05.23</a:t>
             </a:fld>
             <a:endParaRPr lang="ru-RU" noProof="0"/>
           </a:p>
@@ -8771,7 +8774,7 @@
             <a:pPr rtl="0"/>
             <a:fld id="{79742827-D144-4B2C-B4EF-283D1A1D2ABE}" type="datetime1">
               <a:rPr lang="ru-RU" noProof="0" smtClean="0"/>
-              <a:t>25.04.2023</a:t>
+              <a:t>01.05.23</a:t>
             </a:fld>
             <a:endParaRPr lang="ru-RU" noProof="0"/>
           </a:p>
@@ -9076,7 +9079,7 @@
             <a:pPr rtl="0"/>
             <a:fld id="{66134D18-76F3-4340-B8E3-CE0608B72693}" type="datetime1">
               <a:rPr lang="ru-RU" noProof="0" smtClean="0"/>
-              <a:t>25.04.2023</a:t>
+              <a:t>01.05.23</a:t>
             </a:fld>
             <a:endParaRPr lang="ru-RU" noProof="0"/>
           </a:p>
@@ -9500,7 +9503,7 @@
             <a:pPr rtl="0"/>
             <a:fld id="{61B1DAD5-1ADC-4BAD-A5A2-B644A9983A58}" type="datetime1">
               <a:rPr lang="ru-RU" noProof="0" smtClean="0"/>
-              <a:t>25.04.2023</a:t>
+              <a:t>01.05.23</a:t>
             </a:fld>
             <a:endParaRPr lang="ru-RU" noProof="0"/>
           </a:p>
@@ -9599,7 +9602,7 @@
             <a:pPr rtl="0"/>
             <a:fld id="{D34B273F-9A6A-422D-A6AB-3990B7538E9C}" type="datetime1">
               <a:rPr lang="ru-RU" noProof="0" smtClean="0"/>
-              <a:t>25.04.2023</a:t>
+              <a:t>01.05.23</a:t>
             </a:fld>
             <a:endParaRPr lang="ru-RU" noProof="0"/>
           </a:p>
@@ -9765,7 +9768,7 @@
             <a:pPr rtl="0"/>
             <a:fld id="{0F026E7C-B2F6-41BB-9643-AACFC392E830}" type="datetime1">
               <a:rPr lang="ru-RU" noProof="0" smtClean="0"/>
-              <a:t>25.04.2023</a:t>
+              <a:t>01.05.23</a:t>
             </a:fld>
             <a:endParaRPr lang="ru-RU" noProof="0"/>
           </a:p>
@@ -10146,7 +10149,7 @@
             <a:pPr rtl="0"/>
             <a:fld id="{72B0968A-0AED-4FB8-B40B-FB67848094BA}" type="datetime1">
               <a:rPr lang="ru-RU" noProof="0" smtClean="0"/>
-              <a:t>25.04.2023</a:t>
+              <a:t>01.05.23</a:t>
             </a:fld>
             <a:endParaRPr lang="ru-RU" noProof="0"/>
           </a:p>
@@ -10439,7 +10442,7 @@
             <a:pPr rtl="0"/>
             <a:fld id="{0E1F5BCB-5907-4BE5-BDA8-E10478C468F1}" type="datetime1">
               <a:rPr lang="ru-RU" noProof="0" smtClean="0"/>
-              <a:t>25.04.2023</a:t>
+              <a:t>01.05.23</a:t>
             </a:fld>
             <a:endParaRPr lang="ru-RU" noProof="0"/>
           </a:p>
@@ -10655,7 +10658,7 @@
             <a:fld id="{22E8C287-D018-43BB-961A-194062A1E79C}" type="datetime1">
               <a:rPr lang="ru-RU" smtClean="0"/>
               <a:pPr/>
-              <a:t>25.04.2023</a:t>
+              <a:t>01.05.23</a:t>
             </a:fld>
             <a:endParaRPr lang="ru-RU"/>
           </a:p>
@@ -11777,6 +11780,111 @@
 <file path=ppt/slides/slide2.xml><?xml version="1.0" encoding="utf-8"?>
 <p:sld xmlns:a="http://schemas.openxmlformats.org/drawingml/2006/main" xmlns:r="http://schemas.openxmlformats.org/officeDocument/2006/relationships" xmlns:p="http://schemas.openxmlformats.org/presentationml/2006/main">
   <p:cSld>
+    <p:spTree>
+      <p:nvGrpSpPr>
+        <p:cNvPr id="1" name=""/>
+        <p:cNvGrpSpPr/>
+        <p:nvPr/>
+      </p:nvGrpSpPr>
+      <p:grpSpPr>
+        <a:xfrm>
+          <a:off x="0" y="0"/>
+          <a:ext cx="0" cy="0"/>
+          <a:chOff x="0" y="0"/>
+          <a:chExt cx="0" cy="0"/>
+        </a:xfrm>
+      </p:grpSpPr>
+      <p:sp>
+        <p:nvSpPr>
+          <p:cNvPr id="2" name="Заголовок 1">
+            <a:extLst>
+              <a:ext uri="{FF2B5EF4-FFF2-40B4-BE49-F238E27FC236}">
+                <a16:creationId xmlns:a16="http://schemas.microsoft.com/office/drawing/2014/main" id="{D6F79727-F47A-9DF9-CA4F-9C6DE35FDFE9}"/>
+              </a:ext>
+            </a:extLst>
+          </p:cNvPr>
+          <p:cNvSpPr>
+            <a:spLocks noGrp="1"/>
+          </p:cNvSpPr>
+          <p:nvPr>
+            <p:ph type="title"/>
+          </p:nvPr>
+        </p:nvSpPr>
+        <p:spPr/>
+        <p:txBody>
+          <a:bodyPr/>
+          <a:lstStyle/>
+          <a:p>
+            <a:r>
+              <a:rPr lang="ru-RU" dirty="0"/>
+              <a:t>Цель</a:t>
+            </a:r>
+          </a:p>
+        </p:txBody>
+      </p:sp>
+      <p:sp>
+        <p:nvSpPr>
+          <p:cNvPr id="3" name="Объект 2">
+            <a:extLst>
+              <a:ext uri="{FF2B5EF4-FFF2-40B4-BE49-F238E27FC236}">
+                <a16:creationId xmlns:a16="http://schemas.microsoft.com/office/drawing/2014/main" id="{C7D09B08-2F01-2887-2EDC-A09B05AB2FA7}"/>
+              </a:ext>
+            </a:extLst>
+          </p:cNvPr>
+          <p:cNvSpPr>
+            <a:spLocks noGrp="1"/>
+          </p:cNvSpPr>
+          <p:nvPr>
+            <p:ph idx="1"/>
+          </p:nvPr>
+        </p:nvSpPr>
+        <p:spPr/>
+        <p:txBody>
+          <a:bodyPr/>
+          <a:lstStyle/>
+          <a:p>
+            <a:pPr marL="0" indent="0">
+              <a:buNone/>
+            </a:pPr>
+            <a:r>
+              <a:rPr lang="ru-RU" sz="2800" dirty="0">
+                <a:latin typeface="-apple-system"/>
+              </a:rPr>
+              <a:t>С</a:t>
+            </a:r>
+            <a:r>
+              <a:rPr lang="ru-RU" sz="2800" b="0" i="0" dirty="0">
+                <a:effectLst/>
+                <a:latin typeface="-apple-system"/>
+              </a:rPr>
+              <a:t>оздать сайт, на котором будут показаны разные вещи, цены на них, отзывы (эта информация будет, возможно, взята с др. сайтов). Зарегистрированный пользователь сможет добавлять предметы в отслеживаемые, чтобы иметь быстрый доступ к информации о предмете, а также он сможет смотреть эту информацию через бота. Бот, принимая на вход "ключ-пропуск" на аккаунт, будет сообщать название и цену отслеживаемых вещей.</a:t>
+            </a:r>
+            <a:endParaRPr lang="ru-RU" sz="2800" dirty="0"/>
+          </a:p>
+          <a:p>
+            <a:pPr marL="0" indent="0">
+              <a:buNone/>
+            </a:pPr>
+            <a:endParaRPr lang="ru-RU" dirty="0"/>
+          </a:p>
+        </p:txBody>
+      </p:sp>
+    </p:spTree>
+    <p:extLst>
+      <p:ext uri="{BB962C8B-B14F-4D97-AF65-F5344CB8AC3E}">
+        <p14:creationId xmlns:p14="http://schemas.microsoft.com/office/powerpoint/2010/main" val="2134178870"/>
+      </p:ext>
+    </p:extLst>
+  </p:cSld>
+  <p:clrMapOvr>
+    <a:masterClrMapping/>
+  </p:clrMapOvr>
+</p:sld>
+</file>
+
+<file path=ppt/slides/slide3.xml><?xml version="1.0" encoding="utf-8"?>
+<p:sld xmlns:a="http://schemas.openxmlformats.org/drawingml/2006/main" xmlns:r="http://schemas.openxmlformats.org/officeDocument/2006/relationships" xmlns:p="http://schemas.openxmlformats.org/presentationml/2006/main">
+  <p:cSld>
     <p:bg>
       <p:bgPr>
         <a:solidFill>
@@ -12051,7 +12159,7 @@
 </p:sld>
 </file>
 
-<file path=ppt/slides/slide3.xml><?xml version="1.0" encoding="utf-8"?>
+<file path=ppt/slides/slide4.xml><?xml version="1.0" encoding="utf-8"?>
 <p:sld xmlns:a="http://schemas.openxmlformats.org/drawingml/2006/main" xmlns:r="http://schemas.openxmlformats.org/officeDocument/2006/relationships" xmlns:p="http://schemas.openxmlformats.org/presentationml/2006/main">
   <p:cSld>
     <p:bg>
@@ -12447,7 +12555,7 @@
 </p:sld>
 </file>
 
-<file path=ppt/slides/slide4.xml><?xml version="1.0" encoding="utf-8"?>
+<file path=ppt/slides/slide5.xml><?xml version="1.0" encoding="utf-8"?>
 <p:sld xmlns:a="http://schemas.openxmlformats.org/drawingml/2006/main" xmlns:r="http://schemas.openxmlformats.org/officeDocument/2006/relationships" xmlns:p="http://schemas.openxmlformats.org/presentationml/2006/main">
   <p:cSld>
     <p:spTree>
@@ -12689,7 +12797,502 @@
 </p:sld>
 </file>
 
-<file path=ppt/slides/slide5.xml><?xml version="1.0" encoding="utf-8"?>
+<file path=ppt/slides/slide6.xml><?xml version="1.0" encoding="utf-8"?>
+<p:sld xmlns:a="http://schemas.openxmlformats.org/drawingml/2006/main" xmlns:r="http://schemas.openxmlformats.org/officeDocument/2006/relationships" xmlns:p="http://schemas.openxmlformats.org/presentationml/2006/main">
+  <p:cSld>
+    <p:spTree>
+      <p:nvGrpSpPr>
+        <p:cNvPr id="1" name=""/>
+        <p:cNvGrpSpPr/>
+        <p:nvPr/>
+      </p:nvGrpSpPr>
+      <p:grpSpPr>
+        <a:xfrm>
+          <a:off x="0" y="0"/>
+          <a:ext cx="0" cy="0"/>
+          <a:chOff x="0" y="0"/>
+          <a:chExt cx="0" cy="0"/>
+        </a:xfrm>
+      </p:grpSpPr>
+      <p:sp>
+        <p:nvSpPr>
+          <p:cNvPr id="2" name="Заголовок 1">
+            <a:extLst>
+              <a:ext uri="{FF2B5EF4-FFF2-40B4-BE49-F238E27FC236}">
+                <a16:creationId xmlns:a16="http://schemas.microsoft.com/office/drawing/2014/main" id="{F72F681C-7F4D-B9C2-7E54-5C1061ACCA93}"/>
+              </a:ext>
+            </a:extLst>
+          </p:cNvPr>
+          <p:cNvSpPr>
+            <a:spLocks noGrp="1"/>
+          </p:cNvSpPr>
+          <p:nvPr>
+            <p:ph type="title"/>
+          </p:nvPr>
+        </p:nvSpPr>
+        <p:spPr/>
+        <p:txBody>
+          <a:bodyPr/>
+          <a:lstStyle/>
+          <a:p>
+            <a:r>
+              <a:rPr lang="ru-RU" dirty="0"/>
+              <a:t>Функции для сайта</a:t>
+            </a:r>
+          </a:p>
+        </p:txBody>
+      </p:sp>
+      <p:sp>
+        <p:nvSpPr>
+          <p:cNvPr id="3" name="Объект 2">
+            <a:extLst>
+              <a:ext uri="{FF2B5EF4-FFF2-40B4-BE49-F238E27FC236}">
+                <a16:creationId xmlns:a16="http://schemas.microsoft.com/office/drawing/2014/main" id="{186BC900-A18C-25A6-18B2-2E2D4F46069C}"/>
+              </a:ext>
+            </a:extLst>
+          </p:cNvPr>
+          <p:cNvSpPr>
+            <a:spLocks noGrp="1"/>
+          </p:cNvSpPr>
+          <p:nvPr>
+            <p:ph sz="half" idx="1"/>
+          </p:nvPr>
+        </p:nvSpPr>
+        <p:spPr>
+          <a:xfrm>
+            <a:off x="435006" y="2299317"/>
+            <a:ext cx="11292395" cy="4465467"/>
+          </a:xfrm>
+        </p:spPr>
+        <p:txBody>
+          <a:bodyPr>
+            <a:normAutofit fontScale="25000" lnSpcReduction="20000"/>
+          </a:bodyPr>
+          <a:lstStyle/>
+          <a:p>
+            <a:r>
+              <a:rPr lang="en-US" sz="6400" dirty="0" err="1"/>
+              <a:t>Not_found</a:t>
+            </a:r>
+            <a:r>
+              <a:rPr lang="en-US" sz="6400" dirty="0"/>
+              <a:t>, </a:t>
+            </a:r>
+            <a:r>
+              <a:rPr lang="en-US" sz="6400" dirty="0" err="1"/>
+              <a:t>bad_request</a:t>
+            </a:r>
+            <a:r>
+              <a:rPr lang="en-US" sz="6400" dirty="0"/>
+              <a:t> – </a:t>
+            </a:r>
+            <a:r>
+              <a:rPr lang="ru-RU" sz="6400" dirty="0"/>
+              <a:t>проверка на ошибки</a:t>
+            </a:r>
+            <a:r>
+              <a:rPr lang="en-US" sz="6400" dirty="0"/>
+              <a:t> </a:t>
+            </a:r>
+            <a:r>
+              <a:rPr lang="ru-RU" sz="6400" dirty="0"/>
+              <a:t>запросов</a:t>
+            </a:r>
+            <a:endParaRPr lang="en-US" sz="6400" dirty="0"/>
+          </a:p>
+          <a:p>
+            <a:r>
+              <a:rPr lang="en-US" sz="6400" dirty="0"/>
+              <a:t>Index – </a:t>
+            </a:r>
+            <a:r>
+              <a:rPr lang="ru-RU" sz="6400" dirty="0"/>
+              <a:t>выводит главную страницу со всеми предметами</a:t>
+            </a:r>
+          </a:p>
+          <a:p>
+            <a:r>
+              <a:rPr lang="en-US" sz="6400" dirty="0" err="1"/>
+              <a:t>Sorting_page</a:t>
+            </a:r>
+            <a:r>
+              <a:rPr lang="en-US" sz="6400" dirty="0"/>
+              <a:t> </a:t>
+            </a:r>
+            <a:r>
+              <a:rPr lang="ru-RU" sz="6400" dirty="0"/>
+              <a:t>– выводит страницу для сортировки по категориям</a:t>
+            </a:r>
+          </a:p>
+          <a:p>
+            <a:r>
+              <a:rPr lang="en-US" sz="6400" dirty="0" err="1"/>
+              <a:t>Sort_by_category</a:t>
+            </a:r>
+            <a:r>
+              <a:rPr lang="en-US" sz="6400" dirty="0"/>
+              <a:t> –</a:t>
+            </a:r>
+            <a:r>
+              <a:rPr lang="ru-RU" sz="6400" dirty="0"/>
+              <a:t> выводит главную страницу с предметами определенной категории</a:t>
+            </a:r>
+            <a:r>
+              <a:rPr lang="en-US" sz="6400" dirty="0"/>
+              <a:t> </a:t>
+            </a:r>
+            <a:endParaRPr lang="ru-RU" sz="6400" dirty="0"/>
+          </a:p>
+          <a:p>
+            <a:r>
+              <a:rPr lang="en-US" sz="6400" dirty="0" err="1"/>
+              <a:t>Other_users</a:t>
+            </a:r>
+            <a:r>
+              <a:rPr lang="en-US" sz="6400" dirty="0"/>
+              <a:t> – </a:t>
+            </a:r>
+            <a:r>
+              <a:rPr lang="ru-RU" sz="6400" dirty="0"/>
+              <a:t>выводит страницу других пользователей</a:t>
+            </a:r>
+          </a:p>
+          <a:p>
+            <a:r>
+              <a:rPr lang="en-US" sz="6400" dirty="0"/>
+              <a:t>About – </a:t>
+            </a:r>
+            <a:r>
+              <a:rPr lang="ru-RU" sz="6400" dirty="0"/>
+              <a:t>выводит страницу с информацией о проекте</a:t>
+            </a:r>
+          </a:p>
+          <a:p>
+            <a:r>
+              <a:rPr lang="en-US" sz="6400" dirty="0" err="1"/>
+              <a:t>Account_other</a:t>
+            </a:r>
+            <a:r>
+              <a:rPr lang="en-US" sz="6400" dirty="0"/>
+              <a:t> – </a:t>
+            </a:r>
+            <a:r>
+              <a:rPr lang="ru-RU" sz="6400" dirty="0"/>
+              <a:t>выводит страницу со всеми другими пользователями</a:t>
+            </a:r>
+          </a:p>
+          <a:p>
+            <a:r>
+              <a:rPr lang="en-US" sz="6400" dirty="0"/>
+              <a:t>Account - </a:t>
+            </a:r>
+            <a:r>
+              <a:rPr lang="ru-RU" sz="6400" dirty="0"/>
+              <a:t>выводит страницу отслеживаемыми предметами пользователя</a:t>
+            </a:r>
+          </a:p>
+          <a:p>
+            <a:r>
+              <a:rPr lang="en-US" sz="6400" dirty="0"/>
+              <a:t>Logout – </a:t>
+            </a:r>
+            <a:r>
+              <a:rPr lang="ru-RU" sz="6400" dirty="0"/>
+              <a:t>выход из аккаунта</a:t>
+            </a:r>
+          </a:p>
+          <a:p>
+            <a:r>
+              <a:rPr lang="en-US" sz="6400" dirty="0" err="1"/>
+              <a:t>Add_items</a:t>
+            </a:r>
+            <a:r>
+              <a:rPr lang="en-US" sz="6400" dirty="0"/>
+              <a:t> – </a:t>
+            </a:r>
+            <a:r>
+              <a:rPr lang="ru-RU" sz="6400" dirty="0"/>
+              <a:t>отслеживание чужого предмета</a:t>
+            </a:r>
+          </a:p>
+          <a:p>
+            <a:r>
+              <a:rPr lang="en-US" sz="6400" dirty="0" err="1"/>
+              <a:t>Add_new_items</a:t>
+            </a:r>
+            <a:r>
+              <a:rPr lang="en-US" sz="6400" dirty="0"/>
+              <a:t> – </a:t>
+            </a:r>
+            <a:r>
+              <a:rPr lang="ru-RU" sz="6400" dirty="0"/>
+              <a:t>создание нового отслеживаемого</a:t>
+            </a:r>
+          </a:p>
+          <a:p>
+            <a:r>
+              <a:rPr lang="en-US" sz="6400" dirty="0" err="1"/>
+              <a:t>Edit_items</a:t>
+            </a:r>
+            <a:r>
+              <a:rPr lang="en-US" sz="6400" dirty="0"/>
+              <a:t> – </a:t>
+            </a:r>
+            <a:r>
+              <a:rPr lang="ru-RU" sz="6400" dirty="0"/>
+              <a:t>изменение информации об отслеживаемых предметах</a:t>
+            </a:r>
+          </a:p>
+          <a:p>
+            <a:r>
+              <a:rPr lang="en-US" sz="6400" dirty="0" err="1"/>
+              <a:t>Items_delete</a:t>
+            </a:r>
+            <a:r>
+              <a:rPr lang="en-US" sz="6400" dirty="0"/>
+              <a:t> – </a:t>
+            </a:r>
+            <a:r>
+              <a:rPr lang="ru-RU" sz="6400" dirty="0"/>
+              <a:t>удаление отслеживаемого</a:t>
+            </a:r>
+            <a:endParaRPr lang="en-US" sz="6400" dirty="0"/>
+          </a:p>
+          <a:p>
+            <a:r>
+              <a:rPr lang="en-US" sz="6400" dirty="0"/>
+              <a:t>Login – </a:t>
+            </a:r>
+            <a:r>
+              <a:rPr lang="ru-RU" sz="6400" dirty="0"/>
+              <a:t>функция входа в аккаунт</a:t>
+            </a:r>
+          </a:p>
+          <a:p>
+            <a:r>
+              <a:rPr lang="en-US" sz="6400" dirty="0"/>
+              <a:t>Register – </a:t>
+            </a:r>
+            <a:r>
+              <a:rPr lang="ru-RU" sz="6400" dirty="0"/>
+              <a:t>регистрация нового аккаунта</a:t>
+            </a:r>
+          </a:p>
+          <a:p>
+            <a:r>
+              <a:rPr lang="en-US" sz="6400" dirty="0" err="1"/>
+              <a:t>Load_user</a:t>
+            </a:r>
+            <a:r>
+              <a:rPr lang="en-US" sz="6400" dirty="0"/>
+              <a:t>  - </a:t>
+            </a:r>
+            <a:r>
+              <a:rPr lang="ru-RU" sz="6400" dirty="0"/>
+              <a:t>загружает базу данных о пользователе по его </a:t>
+            </a:r>
+            <a:r>
+              <a:rPr lang="en-US" sz="6400" dirty="0"/>
+              <a:t>id</a:t>
+            </a:r>
+            <a:r>
+              <a:rPr lang="ru-RU" sz="6400" dirty="0"/>
+              <a:t> </a:t>
+            </a:r>
+          </a:p>
+          <a:p>
+            <a:endParaRPr lang="ru-RU" dirty="0"/>
+          </a:p>
+          <a:p>
+            <a:endParaRPr lang="ru-RU" dirty="0"/>
+          </a:p>
+        </p:txBody>
+      </p:sp>
+    </p:spTree>
+    <p:extLst>
+      <p:ext uri="{BB962C8B-B14F-4D97-AF65-F5344CB8AC3E}">
+        <p14:creationId xmlns:p14="http://schemas.microsoft.com/office/powerpoint/2010/main" val="4291657252"/>
+      </p:ext>
+    </p:extLst>
+  </p:cSld>
+  <p:clrMapOvr>
+    <a:masterClrMapping/>
+  </p:clrMapOvr>
+</p:sld>
+</file>
+
+<file path=ppt/slides/slide7.xml><?xml version="1.0" encoding="utf-8"?>
+<p:sld xmlns:a="http://schemas.openxmlformats.org/drawingml/2006/main" xmlns:r="http://schemas.openxmlformats.org/officeDocument/2006/relationships" xmlns:p="http://schemas.openxmlformats.org/presentationml/2006/main">
+  <p:cSld>
+    <p:spTree>
+      <p:nvGrpSpPr>
+        <p:cNvPr id="1" name=""/>
+        <p:cNvGrpSpPr/>
+        <p:nvPr/>
+      </p:nvGrpSpPr>
+      <p:grpSpPr>
+        <a:xfrm>
+          <a:off x="0" y="0"/>
+          <a:ext cx="0" cy="0"/>
+          <a:chOff x="0" y="0"/>
+          <a:chExt cx="0" cy="0"/>
+        </a:xfrm>
+      </p:grpSpPr>
+      <p:sp>
+        <p:nvSpPr>
+          <p:cNvPr id="2" name="Заголовок 1">
+            <a:extLst>
+              <a:ext uri="{FF2B5EF4-FFF2-40B4-BE49-F238E27FC236}">
+                <a16:creationId xmlns:a16="http://schemas.microsoft.com/office/drawing/2014/main" id="{8CA0B44C-A9D3-3710-3C81-63DF1E3068C5}"/>
+              </a:ext>
+            </a:extLst>
+          </p:cNvPr>
+          <p:cNvSpPr>
+            <a:spLocks noGrp="1"/>
+          </p:cNvSpPr>
+          <p:nvPr>
+            <p:ph type="title"/>
+          </p:nvPr>
+        </p:nvSpPr>
+        <p:spPr/>
+        <p:txBody>
+          <a:bodyPr/>
+          <a:lstStyle/>
+          <a:p>
+            <a:r>
+              <a:rPr lang="ru-RU" dirty="0"/>
+              <a:t>Использованные библиотеки</a:t>
+            </a:r>
+          </a:p>
+        </p:txBody>
+      </p:sp>
+      <p:sp>
+        <p:nvSpPr>
+          <p:cNvPr id="3" name="Объект 2">
+            <a:extLst>
+              <a:ext uri="{FF2B5EF4-FFF2-40B4-BE49-F238E27FC236}">
+                <a16:creationId xmlns:a16="http://schemas.microsoft.com/office/drawing/2014/main" id="{5EC1FC30-6F52-D77C-6DBF-664FFAEF9E50}"/>
+              </a:ext>
+            </a:extLst>
+          </p:cNvPr>
+          <p:cNvSpPr>
+            <a:spLocks noGrp="1"/>
+          </p:cNvSpPr>
+          <p:nvPr>
+            <p:ph sz="half" idx="1"/>
+          </p:nvPr>
+        </p:nvSpPr>
+        <p:spPr>
+          <a:xfrm>
+            <a:off x="581192" y="2228003"/>
+            <a:ext cx="11155087" cy="4163919"/>
+          </a:xfrm>
+        </p:spPr>
+        <p:txBody>
+          <a:bodyPr>
+            <a:normAutofit fontScale="85000" lnSpcReduction="20000"/>
+          </a:bodyPr>
+          <a:lstStyle/>
+          <a:p>
+            <a:r>
+              <a:rPr lang="en-US" sz="2200" dirty="0"/>
+              <a:t>Flask</a:t>
+            </a:r>
+          </a:p>
+          <a:p>
+            <a:r>
+              <a:rPr lang="en-US" sz="2200" dirty="0" err="1"/>
+              <a:t>Os</a:t>
+            </a:r>
+            <a:endParaRPr lang="en-US" sz="2200" dirty="0"/>
+          </a:p>
+          <a:p>
+            <a:r>
+              <a:rPr lang="en-US" sz="2200" dirty="0"/>
+              <a:t>Datetime</a:t>
+            </a:r>
+          </a:p>
+          <a:p>
+            <a:r>
+              <a:rPr lang="en-US" sz="2200" dirty="0" err="1"/>
+              <a:t>Flask_login</a:t>
+            </a:r>
+            <a:endParaRPr lang="en-US" sz="2200" dirty="0"/>
+          </a:p>
+          <a:p>
+            <a:r>
+              <a:rPr lang="en-US" sz="2200" dirty="0" err="1"/>
+              <a:t>Flask_restful</a:t>
+            </a:r>
+            <a:endParaRPr lang="en-US" sz="2200" dirty="0"/>
+          </a:p>
+          <a:p>
+            <a:r>
+              <a:rPr lang="en-US" sz="2200" dirty="0" err="1"/>
+              <a:t>telebot</a:t>
+            </a:r>
+            <a:endParaRPr lang="en-US" sz="2200" dirty="0"/>
+          </a:p>
+          <a:p>
+            <a:r>
+              <a:rPr lang="en-US" sz="2200" dirty="0" err="1"/>
+              <a:t>Sqlalchemy</a:t>
+            </a:r>
+            <a:endParaRPr lang="en-US" sz="2200" dirty="0"/>
+          </a:p>
+          <a:p>
+            <a:r>
+              <a:rPr lang="en-US" sz="2200" dirty="0" err="1"/>
+              <a:t>Sqlalchemy_serializer</a:t>
+            </a:r>
+            <a:endParaRPr lang="ru-RU" sz="2200" dirty="0"/>
+          </a:p>
+          <a:p>
+            <a:r>
+              <a:rPr lang="en-US" sz="2200" dirty="0" err="1"/>
+              <a:t>Werkzeug.security</a:t>
+            </a:r>
+            <a:endParaRPr lang="en-US" sz="2200" dirty="0"/>
+          </a:p>
+          <a:p>
+            <a:r>
+              <a:rPr lang="en-US" sz="2200" dirty="0" err="1"/>
+              <a:t>Flask_WTF</a:t>
+            </a:r>
+            <a:endParaRPr lang="en-US" sz="2200" dirty="0"/>
+          </a:p>
+          <a:p>
+            <a:r>
+              <a:rPr lang="en-US" sz="2200" dirty="0" err="1"/>
+              <a:t>wtforms</a:t>
+            </a:r>
+            <a:r>
+              <a:rPr lang="en-US" sz="2200" dirty="0"/>
+              <a:t> </a:t>
+            </a:r>
+          </a:p>
+          <a:p>
+            <a:pPr marL="0" indent="0">
+              <a:buNone/>
+            </a:pPr>
+            <a:endParaRPr lang="ru-RU" dirty="0"/>
+          </a:p>
+        </p:txBody>
+      </p:sp>
+    </p:spTree>
+    <p:extLst>
+      <p:ext uri="{BB962C8B-B14F-4D97-AF65-F5344CB8AC3E}">
+        <p14:creationId xmlns:p14="http://schemas.microsoft.com/office/powerpoint/2010/main" val="431982475"/>
+      </p:ext>
+    </p:extLst>
+  </p:cSld>
+  <p:clrMapOvr>
+    <a:masterClrMapping/>
+  </p:clrMapOvr>
+</p:sld>
+</file>
+
+<file path=ppt/slides/slide8.xml><?xml version="1.0" encoding="utf-8"?>
 <p:sld xmlns:a="http://schemas.openxmlformats.org/drawingml/2006/main" xmlns:r="http://schemas.openxmlformats.org/officeDocument/2006/relationships" xmlns:p="http://schemas.openxmlformats.org/presentationml/2006/main">
   <p:cSld>
     <p:spTree>
@@ -12766,7 +13369,14 @@
             </a:r>
             <a:r>
               <a:rPr lang="ru-RU" dirty="0"/>
-              <a:t>база данных с информацией о пользователях</a:t>
+              <a:t>база данных с информацией </a:t>
+            </a:r>
+            <a:br>
+              <a:rPr lang="ru-RU" dirty="0"/>
+            </a:br>
+            <a:r>
+              <a:rPr lang="ru-RU" dirty="0"/>
+              <a:t>о пользователях</a:t>
             </a:r>
           </a:p>
           <a:p>
@@ -12818,8 +13428,8 @@
         </p:blipFill>
         <p:spPr>
           <a:xfrm>
-            <a:off x="6095999" y="3657600"/>
-            <a:ext cx="5514976" cy="3200400"/>
+            <a:off x="6214888" y="3897297"/>
+            <a:ext cx="5514976" cy="2960703"/>
           </a:xfrm>
         </p:spPr>
       </p:pic>
@@ -12845,8 +13455,8 @@
         </p:blipFill>
         <p:spPr>
           <a:xfrm>
-            <a:off x="6095999" y="1857155"/>
-            <a:ext cx="5514809" cy="2034125"/>
+            <a:off x="6215055" y="1893410"/>
+            <a:ext cx="5514809" cy="2252460"/>
           </a:xfrm>
           <a:prstGeom prst="rect">
             <a:avLst/>
@@ -12866,7 +13476,7 @@
 </p:sld>
 </file>
 
-<file path=ppt/slides/slide6.xml><?xml version="1.0" encoding="utf-8"?>
+<file path=ppt/slides/slide9.xml><?xml version="1.0" encoding="utf-8"?>
 <p:sld xmlns:a="http://schemas.openxmlformats.org/drawingml/2006/main" xmlns:r="http://schemas.openxmlformats.org/officeDocument/2006/relationships" xmlns:p="http://schemas.openxmlformats.org/presentationml/2006/main">
   <p:cSld>
     <p:bg>

</xml_diff>